<commit_message>
11:15 - 11:30: A5 Notizbuch & Q9h Appointment, Escalero Datenbankansatz; Anmeldedialog, Wuerfeltableau, Wuerfelwerte. 11:30 - 11:54:  Escalero2.pptx; MVC Struktur Admin angepasst & single slide PDF-printed.
</commit_message>
<xml_diff>
--- a/doc/drafts/Escalero2.pptx
+++ b/doc/drafts/Escalero2.pptx
@@ -4455,30 +4455,30 @@
     </dgm:pt>
   </dgm:ptLst>
   <dgm:cxnLst>
+    <dgm:cxn modelId="{A878398D-A9FE-4C7A-A1D6-0B5E817DDD41}" srcId="{4AB4EE93-EDEF-4CB7-8CE6-A5FE3B616664}" destId="{1C48A47E-6620-4763-AE9F-160ADC5C86FD}" srcOrd="0" destOrd="0" parTransId="{359C44DC-8478-4EA0-96B1-8CF68EE66099}" sibTransId="{E772A9D9-EF31-4D01-9EB8-2F5B30EAF7BD}"/>
+    <dgm:cxn modelId="{6CAF1FA4-62AC-4CF1-ACEA-7672776E299A}" type="presOf" srcId="{FE7604A4-6861-42B0-B707-9BC378F55B37}" destId="{B19D7D53-B73D-4932-92C6-2BE366C2BA5C}" srcOrd="1" destOrd="0" presId="urn:microsoft.com/office/officeart/2005/8/layout/hierarchy6"/>
+    <dgm:cxn modelId="{3512E875-0732-4C6F-BB2D-53116B7188E2}" srcId="{8FB62134-F03E-4B79-B385-F3509E8FC867}" destId="{37ED7DFF-BE6D-4D51-AE74-71B6E23F9A52}" srcOrd="0" destOrd="0" parTransId="{C870058C-66D6-4ECD-8A46-11866EC304EE}" sibTransId="{844A532D-4476-44D9-9C82-88EDF67F46C0}"/>
+    <dgm:cxn modelId="{4DAD1FDE-4BE2-43C4-9EDD-076C314D28DE}" type="presOf" srcId="{97C7A42A-F95C-4B85-8DE6-2F196722E8AE}" destId="{0A7B5479-5667-4BC8-9C47-9989D798ABE0}" srcOrd="0" destOrd="0" presId="urn:microsoft.com/office/officeart/2005/8/layout/hierarchy6"/>
+    <dgm:cxn modelId="{70210A41-CB34-496B-856E-D2B10861F710}" srcId="{E1545D38-08EA-4F47-A9C2-7D7EDCE86699}" destId="{FAB3DC2D-7EA1-4D76-9C1B-C8B15CBDCD87}" srcOrd="0" destOrd="0" parTransId="{4F9875EA-06BC-4BA9-84A6-02719675FF3E}" sibTransId="{A5CB3014-8B39-43C6-9F91-A00F5962BE11}"/>
+    <dgm:cxn modelId="{AD170F64-5EE4-40A4-8F60-CABCF1B8FE53}" type="presOf" srcId="{97C7A42A-F95C-4B85-8DE6-2F196722E8AE}" destId="{6BDE13E1-BB9A-475A-A108-297308478E67}" srcOrd="1" destOrd="0" presId="urn:microsoft.com/office/officeart/2005/8/layout/hierarchy6"/>
+    <dgm:cxn modelId="{18A095CE-3128-440F-ADBB-D6A17A5627BE}" srcId="{37ED7DFF-BE6D-4D51-AE74-71B6E23F9A52}" destId="{E1545D38-08EA-4F47-A9C2-7D7EDCE86699}" srcOrd="1" destOrd="0" parTransId="{EE451F49-2B26-4650-B5B9-C72E4A7C1F89}" sibTransId="{2541CA29-CD6D-4B5D-8696-CAA2C5DD0BC9}"/>
+    <dgm:cxn modelId="{F269742A-EF83-4974-95F9-7FCE69028001}" type="presOf" srcId="{8FB62134-F03E-4B79-B385-F3509E8FC867}" destId="{065FB6DD-D768-4A59-B644-93EFCDEE1D0E}" srcOrd="0" destOrd="0" presId="urn:microsoft.com/office/officeart/2005/8/layout/hierarchy6"/>
+    <dgm:cxn modelId="{513A204F-44FF-4094-852E-2DD8714D294B}" type="presOf" srcId="{457F0E59-0EC7-4262-99F8-E00C3AA98782}" destId="{A815154C-E469-4D24-B0C1-C411E6342D8B}" srcOrd="0" destOrd="0" presId="urn:microsoft.com/office/officeart/2005/8/layout/hierarchy6"/>
+    <dgm:cxn modelId="{51EAAA7E-9AA4-4967-966B-C1400339218A}" srcId="{37ED7DFF-BE6D-4D51-AE74-71B6E23F9A52}" destId="{4AB4EE93-EDEF-4CB7-8CE6-A5FE3B616664}" srcOrd="0" destOrd="0" parTransId="{EFD5A3EC-FABB-4128-B780-DF970571A707}" sibTransId="{B66E4474-BA86-44D5-BA44-7C4536124838}"/>
+    <dgm:cxn modelId="{E845EBDC-197D-4BF3-A64F-BB0FC008B4E1}" type="presOf" srcId="{457F0E59-0EC7-4262-99F8-E00C3AA98782}" destId="{B91B7123-C939-438D-81B2-57F0F88FBD52}" srcOrd="1" destOrd="0" presId="urn:microsoft.com/office/officeart/2005/8/layout/hierarchy6"/>
+    <dgm:cxn modelId="{2E16115B-C694-4965-AD85-778353965C84}" type="presOf" srcId="{4F9875EA-06BC-4BA9-84A6-02719675FF3E}" destId="{40D3F98C-56A3-4616-BB65-448995B8ADB0}" srcOrd="0" destOrd="0" presId="urn:microsoft.com/office/officeart/2005/8/layout/hierarchy6"/>
+    <dgm:cxn modelId="{5208060E-F363-4A03-9DFA-8117B6CD6EB7}" type="presOf" srcId="{FE7604A4-6861-42B0-B707-9BC378F55B37}" destId="{B7C53DB1-B436-4FB7-904E-0DFBF77B6643}" srcOrd="0" destOrd="0" presId="urn:microsoft.com/office/officeart/2005/8/layout/hierarchy6"/>
+    <dgm:cxn modelId="{A2BDE2BA-F5D8-412D-B07C-0DF080664294}" srcId="{8FB62134-F03E-4B79-B385-F3509E8FC867}" destId="{457F0E59-0EC7-4262-99F8-E00C3AA98782}" srcOrd="3" destOrd="0" parTransId="{6CA70C87-9C0F-4B29-BF4A-B10D1E890DD7}" sibTransId="{D1E423BE-7A92-4719-81F5-2E959481BBC1}"/>
     <dgm:cxn modelId="{B4FF4400-86ED-41DA-AFB7-8F2BD80A874D}" type="presOf" srcId="{359C44DC-8478-4EA0-96B1-8CF68EE66099}" destId="{B6E99760-090C-4105-8CF0-E08E5EE8C8A0}" srcOrd="0" destOrd="0" presId="urn:microsoft.com/office/officeart/2005/8/layout/hierarchy6"/>
+    <dgm:cxn modelId="{073F846E-778C-4EFF-99CA-3AEB3DB960FA}" type="presOf" srcId="{4AB4EE93-EDEF-4CB7-8CE6-A5FE3B616664}" destId="{107A963C-5C6E-493A-AC80-21DD048D045B}" srcOrd="0" destOrd="0" presId="urn:microsoft.com/office/officeart/2005/8/layout/hierarchy6"/>
+    <dgm:cxn modelId="{520E60B5-BB54-4CEE-ADA1-A4C7CA72DD35}" type="presOf" srcId="{EE451F49-2B26-4650-B5B9-C72E4A7C1F89}" destId="{BE80CFFF-D9B4-453E-ADFC-216CA4B57163}" srcOrd="0" destOrd="0" presId="urn:microsoft.com/office/officeart/2005/8/layout/hierarchy6"/>
+    <dgm:cxn modelId="{6F4A00BA-29CC-420B-B18E-EB3EE23F9CE7}" srcId="{8FB62134-F03E-4B79-B385-F3509E8FC867}" destId="{97C7A42A-F95C-4B85-8DE6-2F196722E8AE}" srcOrd="2" destOrd="0" parTransId="{EA3F76C7-E333-4E98-ABF6-94761761DA2A}" sibTransId="{3BD1C1D9-F16E-4C52-BCA9-E62DA408D5E9}"/>
+    <dgm:cxn modelId="{4E02DD1E-E018-4CBC-9841-9AE93F2933FB}" type="presOf" srcId="{E1545D38-08EA-4F47-A9C2-7D7EDCE86699}" destId="{21405A43-B028-4BB2-96B8-5E35E5227A58}" srcOrd="0" destOrd="0" presId="urn:microsoft.com/office/officeart/2005/8/layout/hierarchy6"/>
+    <dgm:cxn modelId="{ABAB6976-0E48-45ED-90D5-2DD0DC8C3BB7}" srcId="{8FB62134-F03E-4B79-B385-F3509E8FC867}" destId="{FE7604A4-6861-42B0-B707-9BC378F55B37}" srcOrd="1" destOrd="0" parTransId="{C11CD2DC-8CD8-4925-B21D-8CBA929A782D}" sibTransId="{5D4EF8B3-6DC2-4BB8-9476-0555FEC2FD89}"/>
+    <dgm:cxn modelId="{B26ACCE9-05BA-4151-8AAE-6376E2548988}" type="presOf" srcId="{1C48A47E-6620-4763-AE9F-160ADC5C86FD}" destId="{0E1BCF13-AAEC-4930-A9F3-6FFCDED6AD48}" srcOrd="0" destOrd="0" presId="urn:microsoft.com/office/officeart/2005/8/layout/hierarchy6"/>
+    <dgm:cxn modelId="{78493991-D36B-4550-9296-49734BA541ED}" type="presOf" srcId="{FAB3DC2D-7EA1-4D76-9C1B-C8B15CBDCD87}" destId="{E59B5453-7F86-462E-956F-70597FEF6E1A}" srcOrd="0" destOrd="0" presId="urn:microsoft.com/office/officeart/2005/8/layout/hierarchy6"/>
+    <dgm:cxn modelId="{6008D90E-12FD-4A15-B9F8-1E0DB6CDACC6}" type="presOf" srcId="{EFD5A3EC-FABB-4128-B780-DF970571A707}" destId="{A48970B8-86C1-4601-8AA1-7D3877D23C93}" srcOrd="0" destOrd="0" presId="urn:microsoft.com/office/officeart/2005/8/layout/hierarchy6"/>
     <dgm:cxn modelId="{C1C7C83A-4C9C-45F8-8CA5-8711A863B867}" type="presOf" srcId="{37ED7DFF-BE6D-4D51-AE74-71B6E23F9A52}" destId="{704D2F69-D632-4183-8D26-9A43BE6A56F8}" srcOrd="0" destOrd="0" presId="urn:microsoft.com/office/officeart/2005/8/layout/hierarchy6"/>
-    <dgm:cxn modelId="{4E02DD1E-E018-4CBC-9841-9AE93F2933FB}" type="presOf" srcId="{E1545D38-08EA-4F47-A9C2-7D7EDCE86699}" destId="{21405A43-B028-4BB2-96B8-5E35E5227A58}" srcOrd="0" destOrd="0" presId="urn:microsoft.com/office/officeart/2005/8/layout/hierarchy6"/>
-    <dgm:cxn modelId="{2E16115B-C694-4965-AD85-778353965C84}" type="presOf" srcId="{4F9875EA-06BC-4BA9-84A6-02719675FF3E}" destId="{40D3F98C-56A3-4616-BB65-448995B8ADB0}" srcOrd="0" destOrd="0" presId="urn:microsoft.com/office/officeart/2005/8/layout/hierarchy6"/>
-    <dgm:cxn modelId="{513A204F-44FF-4094-852E-2DD8714D294B}" type="presOf" srcId="{457F0E59-0EC7-4262-99F8-E00C3AA98782}" destId="{A815154C-E469-4D24-B0C1-C411E6342D8B}" srcOrd="0" destOrd="0" presId="urn:microsoft.com/office/officeart/2005/8/layout/hierarchy6"/>
-    <dgm:cxn modelId="{4DAD1FDE-4BE2-43C4-9EDD-076C314D28DE}" type="presOf" srcId="{97C7A42A-F95C-4B85-8DE6-2F196722E8AE}" destId="{0A7B5479-5667-4BC8-9C47-9989D798ABE0}" srcOrd="0" destOrd="0" presId="urn:microsoft.com/office/officeart/2005/8/layout/hierarchy6"/>
-    <dgm:cxn modelId="{5208060E-F363-4A03-9DFA-8117B6CD6EB7}" type="presOf" srcId="{FE7604A4-6861-42B0-B707-9BC378F55B37}" destId="{B7C53DB1-B436-4FB7-904E-0DFBF77B6643}" srcOrd="0" destOrd="0" presId="urn:microsoft.com/office/officeart/2005/8/layout/hierarchy6"/>
-    <dgm:cxn modelId="{ABAB6976-0E48-45ED-90D5-2DD0DC8C3BB7}" srcId="{8FB62134-F03E-4B79-B385-F3509E8FC867}" destId="{FE7604A4-6861-42B0-B707-9BC378F55B37}" srcOrd="1" destOrd="0" parTransId="{C11CD2DC-8CD8-4925-B21D-8CBA929A782D}" sibTransId="{5D4EF8B3-6DC2-4BB8-9476-0555FEC2FD89}"/>
-    <dgm:cxn modelId="{3512E875-0732-4C6F-BB2D-53116B7188E2}" srcId="{8FB62134-F03E-4B79-B385-F3509E8FC867}" destId="{37ED7DFF-BE6D-4D51-AE74-71B6E23F9A52}" srcOrd="0" destOrd="0" parTransId="{C870058C-66D6-4ECD-8A46-11866EC304EE}" sibTransId="{844A532D-4476-44D9-9C82-88EDF67F46C0}"/>
-    <dgm:cxn modelId="{520E60B5-BB54-4CEE-ADA1-A4C7CA72DD35}" type="presOf" srcId="{EE451F49-2B26-4650-B5B9-C72E4A7C1F89}" destId="{BE80CFFF-D9B4-453E-ADFC-216CA4B57163}" srcOrd="0" destOrd="0" presId="urn:microsoft.com/office/officeart/2005/8/layout/hierarchy6"/>
-    <dgm:cxn modelId="{6008D90E-12FD-4A15-B9F8-1E0DB6CDACC6}" type="presOf" srcId="{EFD5A3EC-FABB-4128-B780-DF970571A707}" destId="{A48970B8-86C1-4601-8AA1-7D3877D23C93}" srcOrd="0" destOrd="0" presId="urn:microsoft.com/office/officeart/2005/8/layout/hierarchy6"/>
-    <dgm:cxn modelId="{6F4A00BA-29CC-420B-B18E-EB3EE23F9CE7}" srcId="{8FB62134-F03E-4B79-B385-F3509E8FC867}" destId="{97C7A42A-F95C-4B85-8DE6-2F196722E8AE}" srcOrd="2" destOrd="0" parTransId="{EA3F76C7-E333-4E98-ABF6-94761761DA2A}" sibTransId="{3BD1C1D9-F16E-4C52-BCA9-E62DA408D5E9}"/>
-    <dgm:cxn modelId="{18A095CE-3128-440F-ADBB-D6A17A5627BE}" srcId="{37ED7DFF-BE6D-4D51-AE74-71B6E23F9A52}" destId="{E1545D38-08EA-4F47-A9C2-7D7EDCE86699}" srcOrd="1" destOrd="0" parTransId="{EE451F49-2B26-4650-B5B9-C72E4A7C1F89}" sibTransId="{2541CA29-CD6D-4B5D-8696-CAA2C5DD0BC9}"/>
-    <dgm:cxn modelId="{78493991-D36B-4550-9296-49734BA541ED}" type="presOf" srcId="{FAB3DC2D-7EA1-4D76-9C1B-C8B15CBDCD87}" destId="{E59B5453-7F86-462E-956F-70597FEF6E1A}" srcOrd="0" destOrd="0" presId="urn:microsoft.com/office/officeart/2005/8/layout/hierarchy6"/>
-    <dgm:cxn modelId="{6CAF1FA4-62AC-4CF1-ACEA-7672776E299A}" type="presOf" srcId="{FE7604A4-6861-42B0-B707-9BC378F55B37}" destId="{B19D7D53-B73D-4932-92C6-2BE366C2BA5C}" srcOrd="1" destOrd="0" presId="urn:microsoft.com/office/officeart/2005/8/layout/hierarchy6"/>
-    <dgm:cxn modelId="{B26ACCE9-05BA-4151-8AAE-6376E2548988}" type="presOf" srcId="{1C48A47E-6620-4763-AE9F-160ADC5C86FD}" destId="{0E1BCF13-AAEC-4930-A9F3-6FFCDED6AD48}" srcOrd="0" destOrd="0" presId="urn:microsoft.com/office/officeart/2005/8/layout/hierarchy6"/>
-    <dgm:cxn modelId="{AD170F64-5EE4-40A4-8F60-CABCF1B8FE53}" type="presOf" srcId="{97C7A42A-F95C-4B85-8DE6-2F196722E8AE}" destId="{6BDE13E1-BB9A-475A-A108-297308478E67}" srcOrd="1" destOrd="0" presId="urn:microsoft.com/office/officeart/2005/8/layout/hierarchy6"/>
-    <dgm:cxn modelId="{51EAAA7E-9AA4-4967-966B-C1400339218A}" srcId="{37ED7DFF-BE6D-4D51-AE74-71B6E23F9A52}" destId="{4AB4EE93-EDEF-4CB7-8CE6-A5FE3B616664}" srcOrd="0" destOrd="0" parTransId="{EFD5A3EC-FABB-4128-B780-DF970571A707}" sibTransId="{B66E4474-BA86-44D5-BA44-7C4536124838}"/>
-    <dgm:cxn modelId="{A2BDE2BA-F5D8-412D-B07C-0DF080664294}" srcId="{8FB62134-F03E-4B79-B385-F3509E8FC867}" destId="{457F0E59-0EC7-4262-99F8-E00C3AA98782}" srcOrd="3" destOrd="0" parTransId="{6CA70C87-9C0F-4B29-BF4A-B10D1E890DD7}" sibTransId="{D1E423BE-7A92-4719-81F5-2E959481BBC1}"/>
-    <dgm:cxn modelId="{A878398D-A9FE-4C7A-A1D6-0B5E817DDD41}" srcId="{4AB4EE93-EDEF-4CB7-8CE6-A5FE3B616664}" destId="{1C48A47E-6620-4763-AE9F-160ADC5C86FD}" srcOrd="0" destOrd="0" parTransId="{359C44DC-8478-4EA0-96B1-8CF68EE66099}" sibTransId="{E772A9D9-EF31-4D01-9EB8-2F5B30EAF7BD}"/>
-    <dgm:cxn modelId="{70210A41-CB34-496B-856E-D2B10861F710}" srcId="{E1545D38-08EA-4F47-A9C2-7D7EDCE86699}" destId="{FAB3DC2D-7EA1-4D76-9C1B-C8B15CBDCD87}" srcOrd="0" destOrd="0" parTransId="{4F9875EA-06BC-4BA9-84A6-02719675FF3E}" sibTransId="{A5CB3014-8B39-43C6-9F91-A00F5962BE11}"/>
-    <dgm:cxn modelId="{E845EBDC-197D-4BF3-A64F-BB0FC008B4E1}" type="presOf" srcId="{457F0E59-0EC7-4262-99F8-E00C3AA98782}" destId="{B91B7123-C939-438D-81B2-57F0F88FBD52}" srcOrd="1" destOrd="0" presId="urn:microsoft.com/office/officeart/2005/8/layout/hierarchy6"/>
-    <dgm:cxn modelId="{073F846E-778C-4EFF-99CA-3AEB3DB960FA}" type="presOf" srcId="{4AB4EE93-EDEF-4CB7-8CE6-A5FE3B616664}" destId="{107A963C-5C6E-493A-AC80-21DD048D045B}" srcOrd="0" destOrd="0" presId="urn:microsoft.com/office/officeart/2005/8/layout/hierarchy6"/>
-    <dgm:cxn modelId="{F269742A-EF83-4974-95F9-7FCE69028001}" type="presOf" srcId="{8FB62134-F03E-4B79-B385-F3509E8FC867}" destId="{065FB6DD-D768-4A59-B644-93EFCDEE1D0E}" srcOrd="0" destOrd="0" presId="urn:microsoft.com/office/officeart/2005/8/layout/hierarchy6"/>
     <dgm:cxn modelId="{EA859210-BCBD-4662-B2F9-D59C87863A3E}" type="presParOf" srcId="{065FB6DD-D768-4A59-B644-93EFCDEE1D0E}" destId="{B1656B42-4CF0-4A10-9673-684C5F580B62}" srcOrd="0" destOrd="0" presId="urn:microsoft.com/office/officeart/2005/8/layout/hierarchy6"/>
     <dgm:cxn modelId="{73F918AF-92B0-42BA-A706-90654B41E582}" type="presParOf" srcId="{B1656B42-4CF0-4A10-9673-684C5F580B62}" destId="{C8486512-4049-4BB2-8381-A9E4E3993883}" srcOrd="0" destOrd="0" presId="urn:microsoft.com/office/officeart/2005/8/layout/hierarchy6"/>
     <dgm:cxn modelId="{93ACACC8-2C17-446E-BFDB-2D6CE7EBE21C}" type="presParOf" srcId="{B1656B42-4CF0-4A10-9673-684C5F580B62}" destId="{B565000D-CD4F-4587-B7DE-37090AB8B04D}" srcOrd="1" destOrd="0" presId="urn:microsoft.com/office/officeart/2005/8/layout/hierarchy6"/>
@@ -5369,8 +5369,14 @@
         <a:lstStyle/>
         <a:p>
           <a:r>
-            <a:rPr lang="de-AT" dirty="0" smtClean="0"/>
+            <a:rPr lang="de-AT" smtClean="0"/>
             <a:t>Datenpflege</a:t>
+          </a:r>
+        </a:p>
+        <a:p>
+          <a:r>
+            <a:rPr lang="de-AT" smtClean="0"/>
+            <a:t> 1 je Tabelle</a:t>
           </a:r>
           <a:endParaRPr lang="de-AT" dirty="0"/>
         </a:p>
@@ -5897,8 +5903,8 @@
     <dgm:cxn modelId="{ADC8D77A-40D3-499E-8BE0-C220208B5AAC}" srcId="{4AB4EE93-EDEF-4CB7-8CE6-A5FE3B616664}" destId="{54C72B87-B614-4233-B3A6-56B3D1F4E59D}" srcOrd="1" destOrd="0" parTransId="{56C4AF2E-627E-4728-900E-EB496710945A}" sibTransId="{1E1FBDFD-F28B-4553-8686-9E435F9E0F18}"/>
     <dgm:cxn modelId="{A2BDE2BA-F5D8-412D-B07C-0DF080664294}" srcId="{8FB62134-F03E-4B79-B385-F3509E8FC867}" destId="{457F0E59-0EC7-4262-99F8-E00C3AA98782}" srcOrd="3" destOrd="0" parTransId="{6CA70C87-9C0F-4B29-BF4A-B10D1E890DD7}" sibTransId="{D1E423BE-7A92-4719-81F5-2E959481BBC1}"/>
     <dgm:cxn modelId="{51EAAA7E-9AA4-4967-966B-C1400339218A}" srcId="{37ED7DFF-BE6D-4D51-AE74-71B6E23F9A52}" destId="{4AB4EE93-EDEF-4CB7-8CE6-A5FE3B616664}" srcOrd="0" destOrd="0" parTransId="{EFD5A3EC-FABB-4128-B780-DF970571A707}" sibTransId="{B66E4474-BA86-44D5-BA44-7C4536124838}"/>
+    <dgm:cxn modelId="{1936D2D6-24E8-4D4F-82ED-058E5E4E2015}" type="presOf" srcId="{EE451F49-2B26-4650-B5B9-C72E4A7C1F89}" destId="{BE80CFFF-D9B4-453E-ADFC-216CA4B57163}" srcOrd="0" destOrd="0" presId="urn:microsoft.com/office/officeart/2005/8/layout/hierarchy6"/>
     <dgm:cxn modelId="{D0A3366C-94A1-4C27-81C1-14DB5301D209}" type="presOf" srcId="{EFD5A3EC-FABB-4128-B780-DF970571A707}" destId="{A48970B8-86C1-4601-8AA1-7D3877D23C93}" srcOrd="0" destOrd="0" presId="urn:microsoft.com/office/officeart/2005/8/layout/hierarchy6"/>
-    <dgm:cxn modelId="{1936D2D6-24E8-4D4F-82ED-058E5E4E2015}" type="presOf" srcId="{EE451F49-2B26-4650-B5B9-C72E4A7C1F89}" destId="{BE80CFFF-D9B4-453E-ADFC-216CA4B57163}" srcOrd="0" destOrd="0" presId="urn:microsoft.com/office/officeart/2005/8/layout/hierarchy6"/>
     <dgm:cxn modelId="{0286DA80-5C05-4601-85CB-B8BD04DC2CAD}" type="presParOf" srcId="{065FB6DD-D768-4A59-B644-93EFCDEE1D0E}" destId="{B1656B42-4CF0-4A10-9673-684C5F580B62}" srcOrd="0" destOrd="0" presId="urn:microsoft.com/office/officeart/2005/8/layout/hierarchy6"/>
     <dgm:cxn modelId="{5C4D14F5-CD54-43DB-A734-C64A0AEAFB6C}" type="presParOf" srcId="{B1656B42-4CF0-4A10-9673-684C5F580B62}" destId="{C8486512-4049-4BB2-8381-A9E4E3993883}" srcOrd="0" destOrd="0" presId="urn:microsoft.com/office/officeart/2005/8/layout/hierarchy6"/>
     <dgm:cxn modelId="{0E092574-DEB5-474E-8A8A-F0F4EBC70FAB}" type="presParOf" srcId="{B1656B42-4CF0-4A10-9673-684C5F580B62}" destId="{B565000D-CD4F-4587-B7DE-37090AB8B04D}" srcOrd="1" destOrd="0" presId="urn:microsoft.com/office/officeart/2005/8/layout/hierarchy6"/>
@@ -9527,8 +9533,25 @@
             </a:spcAft>
           </a:pPr>
           <a:r>
-            <a:rPr lang="de-AT" sz="700" kern="1200" dirty="0" smtClean="0"/>
+            <a:rPr lang="de-AT" sz="700" kern="1200" smtClean="0"/>
             <a:t>Datenpflege</a:t>
+          </a:r>
+        </a:p>
+        <a:p>
+          <a:pPr lvl="0" algn="ctr" defTabSz="311150">
+            <a:lnSpc>
+              <a:spcPct val="90000"/>
+            </a:lnSpc>
+            <a:spcBef>
+              <a:spcPct val="0"/>
+            </a:spcBef>
+            <a:spcAft>
+              <a:spcPct val="35000"/>
+            </a:spcAft>
+          </a:pPr>
+          <a:r>
+            <a:rPr lang="de-AT" sz="700" kern="1200" smtClean="0"/>
+            <a:t> 1 je Tabelle</a:t>
           </a:r>
           <a:endParaRPr lang="de-AT" sz="700" kern="1200" dirty="0"/>
         </a:p>
@@ -15944,7 +15967,7 @@
           <a:p>
             <a:fld id="{3D415D38-ED11-4DCC-86B0-7F8718D9AB4B}" type="datetimeFigureOut">
               <a:rPr lang="de-AT" smtClean="0"/>
-              <a:t>12.01.2018</a:t>
+              <a:t>14.01.2018</a:t>
             </a:fld>
             <a:endParaRPr lang="de-AT"/>
           </a:p>
@@ -16343,7 +16366,7 @@
           <a:p>
             <a:fld id="{08059707-0AC7-484C-91D2-4E61CD9B5B0A}" type="datetime1">
               <a:rPr lang="de-AT" smtClean="0"/>
-              <a:t>12.01.2018</a:t>
+              <a:t>14.01.2018</a:t>
             </a:fld>
             <a:endParaRPr lang="de-AT"/>
           </a:p>
@@ -16528,7 +16551,7 @@
           <a:p>
             <a:fld id="{66A308FD-36A4-45D9-A693-13292ECD5319}" type="datetime1">
               <a:rPr lang="de-AT" smtClean="0"/>
-              <a:t>12.01.2018</a:t>
+              <a:t>14.01.2018</a:t>
             </a:fld>
             <a:endParaRPr lang="de-AT"/>
           </a:p>
@@ -16712,7 +16735,7 @@
           <a:p>
             <a:fld id="{40C8337F-DFC9-4399-88A7-D9E005152FAE}" type="datetime1">
               <a:rPr lang="de-AT" smtClean="0"/>
-              <a:t>12.01.2018</a:t>
+              <a:t>14.01.2018</a:t>
             </a:fld>
             <a:endParaRPr lang="de-AT"/>
           </a:p>
@@ -16886,7 +16909,7 @@
           <a:p>
             <a:fld id="{4152639D-38A2-4F73-815E-E79A27EFBB58}" type="datetime1">
               <a:rPr lang="de-AT" smtClean="0"/>
-              <a:t>12.01.2018</a:t>
+              <a:t>14.01.2018</a:t>
             </a:fld>
             <a:endParaRPr lang="de-AT" dirty="0"/>
           </a:p>
@@ -17136,7 +17159,7 @@
           <a:p>
             <a:fld id="{7A07F978-DB14-42C3-AB04-2CCE9E077389}" type="datetime1">
               <a:rPr lang="de-AT" smtClean="0"/>
-              <a:t>12.01.2018</a:t>
+              <a:t>14.01.2018</a:t>
             </a:fld>
             <a:endParaRPr lang="de-AT"/>
           </a:p>
@@ -17372,7 +17395,7 @@
           <a:p>
             <a:fld id="{8D019129-6DDD-4D4D-ADB9-A552E67C9184}" type="datetime1">
               <a:rPr lang="de-AT" smtClean="0"/>
-              <a:t>12.01.2018</a:t>
+              <a:t>14.01.2018</a:t>
             </a:fld>
             <a:endParaRPr lang="de-AT"/>
           </a:p>
@@ -17743,7 +17766,7 @@
           <a:p>
             <a:fld id="{37725070-FBE3-4CA1-B12A-CB80967530A4}" type="datetime1">
               <a:rPr lang="de-AT" smtClean="0"/>
-              <a:t>12.01.2018</a:t>
+              <a:t>14.01.2018</a:t>
             </a:fld>
             <a:endParaRPr lang="de-AT"/>
           </a:p>
@@ -17865,7 +17888,7 @@
           <a:p>
             <a:fld id="{F8F81EE4-0D7C-41DC-8F5D-DEA14BE6BE04}" type="datetime1">
               <a:rPr lang="de-AT" smtClean="0"/>
-              <a:t>12.01.2018</a:t>
+              <a:t>14.01.2018</a:t>
             </a:fld>
             <a:endParaRPr lang="de-AT"/>
           </a:p>
@@ -17964,7 +17987,7 @@
           <a:p>
             <a:fld id="{7BC2F7B9-C38F-48B7-8B41-A8B90FFEBA10}" type="datetime1">
               <a:rPr lang="de-AT" smtClean="0"/>
-              <a:t>12.01.2018</a:t>
+              <a:t>14.01.2018</a:t>
             </a:fld>
             <a:endParaRPr lang="de-AT"/>
           </a:p>
@@ -18245,7 +18268,7 @@
           <a:p>
             <a:fld id="{FD2B53F3-54E5-4E0C-A1F6-D68B5C7C9C4D}" type="datetime1">
               <a:rPr lang="de-AT" smtClean="0"/>
-              <a:t>12.01.2018</a:t>
+              <a:t>14.01.2018</a:t>
             </a:fld>
             <a:endParaRPr lang="de-AT"/>
           </a:p>
@@ -18502,7 +18525,7 @@
           <a:p>
             <a:fld id="{6D831E63-352F-42FF-9A64-37AD58A6034D}" type="datetime1">
               <a:rPr lang="de-AT" smtClean="0"/>
-              <a:t>12.01.2018</a:t>
+              <a:t>14.01.2018</a:t>
             </a:fld>
             <a:endParaRPr lang="de-AT"/>
           </a:p>
@@ -18719,7 +18742,7 @@
           <a:p>
             <a:fld id="{A5E7F7AD-9754-45CB-A480-E5FF42DF1269}" type="datetime1">
               <a:rPr lang="de-AT" smtClean="0"/>
-              <a:t>12.01.2018</a:t>
+              <a:t>14.01.2018</a:t>
             </a:fld>
             <a:endParaRPr lang="de-AT"/>
           </a:p>
@@ -19208,7 +19231,7 @@
           <a:p>
             <a:fld id="{7871A4D6-1D07-49C2-ACD8-36A7CF228FC3}" type="datetime1">
               <a:rPr lang="de-AT" smtClean="0"/>
-              <a:t>12.01.2018</a:t>
+              <a:t>14.01.2018</a:t>
             </a:fld>
             <a:endParaRPr lang="de-AT"/>
           </a:p>
@@ -19366,7 +19389,7 @@
           <a:p>
             <a:fld id="{1F563509-3FA0-41DE-B784-24E5F17DDC43}" type="datetime1">
               <a:rPr lang="de-AT" smtClean="0"/>
-              <a:t>12.01.2018</a:t>
+              <a:t>14.01.2018</a:t>
             </a:fld>
             <a:endParaRPr lang="de-AT" dirty="0"/>
           </a:p>
@@ -19475,7 +19498,7 @@
           <p:nvPr>
             <p:extLst>
               <p:ext uri="{D42A27DB-BD31-4B8C-83A1-F6EECF244321}">
-                <p14:modId xmlns:p14="http://schemas.microsoft.com/office/powerpoint/2010/main" val="143832471"/>
+                <p14:modId xmlns:p14="http://schemas.microsoft.com/office/powerpoint/2010/main" val="2879952404"/>
               </p:ext>
             </p:extLst>
           </p:nvPr>
@@ -20354,7 +20377,7 @@
           <a:p>
             <a:fld id="{FA7374E6-D473-4A78-B85A-3C1E0B62B6C1}" type="datetime1">
               <a:rPr lang="de-AT" smtClean="0"/>
-              <a:t>12.01.2018</a:t>
+              <a:t>14.01.2018</a:t>
             </a:fld>
             <a:endParaRPr lang="de-AT" dirty="0"/>
           </a:p>
@@ -20593,7 +20616,7 @@
           <a:p>
             <a:fld id="{4152639D-38A2-4F73-815E-E79A27EFBB58}" type="datetime1">
               <a:rPr lang="de-AT" smtClean="0"/>
-              <a:t>12.01.2018</a:t>
+              <a:t>14.01.2018</a:t>
             </a:fld>
             <a:endParaRPr lang="de-AT" dirty="0"/>
           </a:p>
@@ -20781,11 +20804,6 @@
               </a:rPr>
               <a:t>Datenbank verbinden</a:t>
             </a:r>
-            <a:endParaRPr lang="de-AT" dirty="0" smtClean="0">
-              <a:solidFill>
-                <a:schemeClr val="tx1"/>
-              </a:solidFill>
-            </a:endParaRPr>
           </a:p>
         </p:txBody>
       </p:sp>
@@ -20974,11 +20992,6 @@
               </a:rPr>
               <a:t>Anmeldedialog</a:t>
             </a:r>
-            <a:endParaRPr lang="de-AT" dirty="0" smtClean="0">
-              <a:solidFill>
-                <a:schemeClr val="tx1"/>
-              </a:solidFill>
-            </a:endParaRPr>
           </a:p>
         </p:txBody>
       </p:sp>

</xml_diff>